<commit_message>
final updates to presentation
</commit_message>
<xml_diff>
--- a/draft/summary_presentation.pptx
+++ b/draft/summary_presentation.pptx
@@ -2565,8 +2565,8 @@
         </p:nvSpPr>
         <p:spPr>
           <a:xfrm>
-            <a:off x="649064" y="3778250"/>
-            <a:ext cx="11706672" cy="3924301"/>
+            <a:off x="649064" y="4051299"/>
+            <a:ext cx="11706672" cy="3378201"/>
           </a:xfrm>
           <a:prstGeom prst="rect">
             <a:avLst/>
@@ -2597,7 +2597,7 @@
                   <a:srgbClr val="00FDFF"/>
                 </a:solidFill>
               </a:rPr>
-              <a:t>There now exists an open source implementation of QDA for gender classification on human connectome estimates </a:t>
+              <a:t>The principled approach we took to this problem encourages us to believe the results we obtained</a:t>
             </a:r>
             <a:endParaRPr sz="3600">
               <a:solidFill>
@@ -2616,16 +2616,6 @@
             </a:endParaRPr>
           </a:p>
           <a:p>
-            <a:pPr lvl="0" algn="l">
-              <a:defRPr sz="1800"/>
-            </a:pPr>
-            <a:endParaRPr sz="3600">
-              <a:solidFill>
-                <a:srgbClr val="00FDFF"/>
-              </a:solidFill>
-            </a:endParaRPr>
-          </a:p>
-          <a:p>
             <a:pPr lvl="0" marL="444500" indent="-444500" algn="l">
               <a:buSzPct val="75000"/>
               <a:buChar char="•"/>
@@ -2637,7 +2627,7 @@
                   <a:srgbClr val="00FDFF"/>
                 </a:solidFill>
               </a:rPr>
-              <a:t>This is a building block for future studies which can expand the use of this classifier to other covariates</a:t>
+              <a:t>This is a building block for future studies which can leverage this domain knowledge to build better classifiers for more difficult covariates</a:t>
             </a:r>
           </a:p>
         </p:txBody>
@@ -3001,7 +2991,7 @@
                   <a:srgbClr val="00FDFF"/>
                 </a:solidFill>
               </a:rPr>
-              <a:t>Currently, no known open source gender (or other covariate) classifiers based on connectome analysis exist</a:t>
+              <a:t>Currently, no known open source sex (or other covariate) classifiers based on connectome analysis exist</a:t>
             </a:r>
           </a:p>
         </p:txBody>
@@ -3014,7 +3004,7 @@
         </p:nvSpPr>
         <p:spPr>
           <a:xfrm>
-            <a:off x="281288" y="9334500"/>
+            <a:off x="281288" y="9334499"/>
             <a:ext cx="12442224" cy="342901"/>
           </a:xfrm>
           <a:prstGeom prst="rect">
@@ -5356,8 +5346,8 @@
         </p:nvGrpSpPr>
         <p:grpSpPr>
           <a:xfrm>
-            <a:off x="5010378" y="1699440"/>
-            <a:ext cx="4044121" cy="6354720"/>
+            <a:off x="5010377" y="1699440"/>
+            <a:ext cx="4044122" cy="6354720"/>
             <a:chOff x="0" y="0"/>
             <a:chExt cx="4044120" cy="6354719"/>
           </a:xfrm>
@@ -5626,8 +5616,8 @@
         </p:blipFill>
         <p:spPr>
           <a:xfrm>
-            <a:off x="9803318" y="159051"/>
-            <a:ext cx="2654894" cy="7951101"/>
+            <a:off x="9803317" y="159051"/>
+            <a:ext cx="2654895" cy="7951101"/>
           </a:xfrm>
           <a:prstGeom prst="rect">
             <a:avLst/>

</xml_diff>